<commit_message>
end semester 1, start semester 2
</commit_message>
<xml_diff>
--- a/Semester 1 Master/Ethics, Research Methodology/presentation.pptx
+++ b/Semester 1 Master/Ethics, Research Methodology/presentation.pptx
@@ -230,7 +230,7 @@
           <a:p>
             <a:fld id="{DDBCFBCF-96FA-4D36-A4EE-F71C369150AD}" type="datetimeFigureOut">
               <a:rPr lang="en-US" smtClean="0"/>
-              <a:t>1/11/2023</a:t>
+              <a:t>1/17/2023</a:t>
             </a:fld>
             <a:endParaRPr lang="en-US"/>
           </a:p>
@@ -541,7 +541,38 @@
           <a:bodyPr/>
           <a:lstStyle/>
           <a:p>
-            <a:endParaRPr lang="en-US" dirty="0"/>
+            <a:pPr marL="171450" indent="-171450">
+              <a:buFontTx/>
+              <a:buChar char="-"/>
+            </a:pPr>
+            <a:r>
+              <a:rPr lang="en-US" dirty="0"/>
+              <a:t>First of all, why I considered this topic interesting and important</a:t>
+            </a:r>
+          </a:p>
+          <a:p>
+            <a:pPr marL="171450" indent="-171450">
+              <a:buFontTx/>
+              <a:buChar char="-"/>
+            </a:pPr>
+            <a:r>
+              <a:rPr lang="en-US" dirty="0" err="1"/>
+              <a:t>Rigurous</a:t>
+            </a:r>
+            <a:r>
+              <a:rPr lang="en-US" dirty="0"/>
+              <a:t> way of presenting results</a:t>
+            </a:r>
+          </a:p>
+          <a:p>
+            <a:pPr marL="171450" indent="-171450">
+              <a:buFontTx/>
+              <a:buChar char="-"/>
+            </a:pPr>
+            <a:r>
+              <a:rPr lang="en-US" dirty="0"/>
+              <a:t>Hard at first, especially for computer science people</a:t>
+            </a:r>
           </a:p>
         </p:txBody>
       </p:sp>
@@ -572,6 +603,1253 @@
     <p:extLst>
       <p:ext uri="{BB962C8B-B14F-4D97-AF65-F5344CB8AC3E}">
         <p14:creationId xmlns:p14="http://schemas.microsoft.com/office/powerpoint/2010/main" val="332032045"/>
+      </p:ext>
+    </p:extLst>
+  </p:cSld>
+  <p:clrMapOvr>
+    <a:masterClrMapping/>
+  </p:clrMapOvr>
+</p:notes>
+</file>
+
+<file path=ppt/notesSlides/notesSlide10.xml><?xml version="1.0" encoding="utf-8"?>
+<p:notes xmlns:a="http://schemas.openxmlformats.org/drawingml/2006/main" xmlns:r="http://schemas.openxmlformats.org/officeDocument/2006/relationships" xmlns:p="http://schemas.openxmlformats.org/presentationml/2006/main">
+  <p:cSld>
+    <p:spTree>
+      <p:nvGrpSpPr>
+        <p:cNvPr id="1" name=""/>
+        <p:cNvGrpSpPr/>
+        <p:nvPr/>
+      </p:nvGrpSpPr>
+      <p:grpSpPr>
+        <a:xfrm>
+          <a:off x="0" y="0"/>
+          <a:ext cx="0" cy="0"/>
+          <a:chOff x="0" y="0"/>
+          <a:chExt cx="0" cy="0"/>
+        </a:xfrm>
+      </p:grpSpPr>
+      <p:sp>
+        <p:nvSpPr>
+          <p:cNvPr id="2" name="Slide Image Placeholder 1"/>
+          <p:cNvSpPr>
+            <a:spLocks noGrp="1" noRot="1" noChangeAspect="1"/>
+          </p:cNvSpPr>
+          <p:nvPr>
+            <p:ph type="sldImg"/>
+          </p:nvPr>
+        </p:nvSpPr>
+        <p:spPr/>
+      </p:sp>
+      <p:sp>
+        <p:nvSpPr>
+          <p:cNvPr id="3" name="Notes Placeholder 2"/>
+          <p:cNvSpPr>
+            <a:spLocks noGrp="1"/>
+          </p:cNvSpPr>
+          <p:nvPr>
+            <p:ph type="body" idx="1"/>
+          </p:nvPr>
+        </p:nvSpPr>
+        <p:spPr/>
+        <p:txBody>
+          <a:bodyPr/>
+          <a:lstStyle/>
+          <a:p>
+            <a:pPr marL="171450" indent="-171450">
+              <a:buFontTx/>
+              <a:buChar char="-"/>
+            </a:pPr>
+            <a:r>
+              <a:rPr lang="en-US" dirty="0"/>
+              <a:t>Conferences </a:t>
+            </a:r>
+          </a:p>
+          <a:p>
+            <a:pPr marL="171450" indent="-171450">
+              <a:buFontTx/>
+              <a:buChar char="-"/>
+            </a:pPr>
+            <a:r>
+              <a:rPr lang="en-US" dirty="0"/>
+              <a:t>Journals</a:t>
+            </a:r>
+          </a:p>
+          <a:p>
+            <a:pPr marL="171450" indent="-171450">
+              <a:buFontTx/>
+              <a:buChar char="-"/>
+            </a:pPr>
+            <a:r>
+              <a:rPr lang="en-US" dirty="0"/>
+              <a:t>Other such as social media or repositories</a:t>
+            </a:r>
+          </a:p>
+        </p:txBody>
+      </p:sp>
+      <p:sp>
+        <p:nvSpPr>
+          <p:cNvPr id="4" name="Slide Number Placeholder 3"/>
+          <p:cNvSpPr>
+            <a:spLocks noGrp="1"/>
+          </p:cNvSpPr>
+          <p:nvPr>
+            <p:ph type="sldNum" sz="quarter" idx="5"/>
+          </p:nvPr>
+        </p:nvSpPr>
+        <p:spPr/>
+        <p:txBody>
+          <a:bodyPr/>
+          <a:lstStyle/>
+          <a:p>
+            <a:fld id="{E67F6501-D017-415D-B9A8-B56036D0E219}" type="slidenum">
+              <a:rPr lang="en-US" smtClean="0"/>
+              <a:t>11</a:t>
+            </a:fld>
+            <a:endParaRPr lang="en-US"/>
+          </a:p>
+        </p:txBody>
+      </p:sp>
+    </p:spTree>
+    <p:extLst>
+      <p:ext uri="{BB962C8B-B14F-4D97-AF65-F5344CB8AC3E}">
+        <p14:creationId xmlns:p14="http://schemas.microsoft.com/office/powerpoint/2010/main" val="1906821929"/>
+      </p:ext>
+    </p:extLst>
+  </p:cSld>
+  <p:clrMapOvr>
+    <a:masterClrMapping/>
+  </p:clrMapOvr>
+</p:notes>
+</file>
+
+<file path=ppt/notesSlides/notesSlide11.xml><?xml version="1.0" encoding="utf-8"?>
+<p:notes xmlns:a="http://schemas.openxmlformats.org/drawingml/2006/main" xmlns:r="http://schemas.openxmlformats.org/officeDocument/2006/relationships" xmlns:p="http://schemas.openxmlformats.org/presentationml/2006/main">
+  <p:cSld>
+    <p:spTree>
+      <p:nvGrpSpPr>
+        <p:cNvPr id="1" name=""/>
+        <p:cNvGrpSpPr/>
+        <p:nvPr/>
+      </p:nvGrpSpPr>
+      <p:grpSpPr>
+        <a:xfrm>
+          <a:off x="0" y="0"/>
+          <a:ext cx="0" cy="0"/>
+          <a:chOff x="0" y="0"/>
+          <a:chExt cx="0" cy="0"/>
+        </a:xfrm>
+      </p:grpSpPr>
+      <p:sp>
+        <p:nvSpPr>
+          <p:cNvPr id="2" name="Slide Image Placeholder 1"/>
+          <p:cNvSpPr>
+            <a:spLocks noGrp="1" noRot="1" noChangeAspect="1"/>
+          </p:cNvSpPr>
+          <p:nvPr>
+            <p:ph type="sldImg"/>
+          </p:nvPr>
+        </p:nvSpPr>
+        <p:spPr/>
+      </p:sp>
+      <p:sp>
+        <p:nvSpPr>
+          <p:cNvPr id="3" name="Notes Placeholder 2"/>
+          <p:cNvSpPr>
+            <a:spLocks noGrp="1"/>
+          </p:cNvSpPr>
+          <p:nvPr>
+            <p:ph type="body" idx="1"/>
+          </p:nvPr>
+        </p:nvSpPr>
+        <p:spPr/>
+        <p:txBody>
+          <a:bodyPr/>
+          <a:lstStyle/>
+          <a:p>
+            <a:r>
+              <a:rPr lang="en-US" dirty="0"/>
+              <a:t>In conclusion, I think that this work could be useful as a guide for beginners in research that are looking to improve their writing skills, and that most parts can be extended to other domains as well.</a:t>
+            </a:r>
+          </a:p>
+        </p:txBody>
+      </p:sp>
+      <p:sp>
+        <p:nvSpPr>
+          <p:cNvPr id="4" name="Slide Number Placeholder 3"/>
+          <p:cNvSpPr>
+            <a:spLocks noGrp="1"/>
+          </p:cNvSpPr>
+          <p:nvPr>
+            <p:ph type="sldNum" sz="quarter" idx="5"/>
+          </p:nvPr>
+        </p:nvSpPr>
+        <p:spPr/>
+        <p:txBody>
+          <a:bodyPr/>
+          <a:lstStyle/>
+          <a:p>
+            <a:fld id="{E67F6501-D017-415D-B9A8-B56036D0E219}" type="slidenum">
+              <a:rPr lang="en-US" smtClean="0"/>
+              <a:t>12</a:t>
+            </a:fld>
+            <a:endParaRPr lang="en-US"/>
+          </a:p>
+        </p:txBody>
+      </p:sp>
+    </p:spTree>
+    <p:extLst>
+      <p:ext uri="{BB962C8B-B14F-4D97-AF65-F5344CB8AC3E}">
+        <p14:creationId xmlns:p14="http://schemas.microsoft.com/office/powerpoint/2010/main" val="3041946537"/>
+      </p:ext>
+    </p:extLst>
+  </p:cSld>
+  <p:clrMapOvr>
+    <a:masterClrMapping/>
+  </p:clrMapOvr>
+</p:notes>
+</file>
+
+<file path=ppt/notesSlides/notesSlide2.xml><?xml version="1.0" encoding="utf-8"?>
+<p:notes xmlns:a="http://schemas.openxmlformats.org/drawingml/2006/main" xmlns:r="http://schemas.openxmlformats.org/officeDocument/2006/relationships" xmlns:p="http://schemas.openxmlformats.org/presentationml/2006/main">
+  <p:cSld>
+    <p:spTree>
+      <p:nvGrpSpPr>
+        <p:cNvPr id="1" name=""/>
+        <p:cNvGrpSpPr/>
+        <p:nvPr/>
+      </p:nvGrpSpPr>
+      <p:grpSpPr>
+        <a:xfrm>
+          <a:off x="0" y="0"/>
+          <a:ext cx="0" cy="0"/>
+          <a:chOff x="0" y="0"/>
+          <a:chExt cx="0" cy="0"/>
+        </a:xfrm>
+      </p:grpSpPr>
+      <p:sp>
+        <p:nvSpPr>
+          <p:cNvPr id="2" name="Slide Image Placeholder 1"/>
+          <p:cNvSpPr>
+            <a:spLocks noGrp="1" noRot="1" noChangeAspect="1"/>
+          </p:cNvSpPr>
+          <p:nvPr>
+            <p:ph type="sldImg"/>
+          </p:nvPr>
+        </p:nvSpPr>
+        <p:spPr/>
+      </p:sp>
+      <p:sp>
+        <p:nvSpPr>
+          <p:cNvPr id="3" name="Notes Placeholder 2"/>
+          <p:cNvSpPr>
+            <a:spLocks noGrp="1"/>
+          </p:cNvSpPr>
+          <p:nvPr>
+            <p:ph type="body" idx="1"/>
+          </p:nvPr>
+        </p:nvSpPr>
+        <p:spPr/>
+        <p:txBody>
+          <a:bodyPr/>
+          <a:lstStyle/>
+          <a:p>
+            <a:pPr marL="171450" indent="-171450">
+              <a:buFontTx/>
+              <a:buChar char="-"/>
+            </a:pPr>
+            <a:r>
+              <a:rPr lang="en-US" dirty="0"/>
+              <a:t>Vast and complex field</a:t>
+            </a:r>
+          </a:p>
+          <a:p>
+            <a:pPr marL="171450" indent="-171450">
+              <a:buFontTx/>
+              <a:buChar char="-"/>
+            </a:pPr>
+            <a:r>
+              <a:rPr lang="en-US" dirty="0"/>
+              <a:t>Infer some mapping between pairs of data</a:t>
+            </a:r>
+          </a:p>
+          <a:p>
+            <a:pPr marL="171450" indent="-171450">
+              <a:buFontTx/>
+              <a:buChar char="-"/>
+            </a:pPr>
+            <a:r>
+              <a:rPr lang="en-US" dirty="0"/>
+              <a:t>Main approaches supervised and unsupervised</a:t>
+            </a:r>
+          </a:p>
+        </p:txBody>
+      </p:sp>
+      <p:sp>
+        <p:nvSpPr>
+          <p:cNvPr id="4" name="Slide Number Placeholder 3"/>
+          <p:cNvSpPr>
+            <a:spLocks noGrp="1"/>
+          </p:cNvSpPr>
+          <p:nvPr>
+            <p:ph type="sldNum" sz="quarter" idx="5"/>
+          </p:nvPr>
+        </p:nvSpPr>
+        <p:spPr/>
+        <p:txBody>
+          <a:bodyPr/>
+          <a:lstStyle/>
+          <a:p>
+            <a:fld id="{E67F6501-D017-415D-B9A8-B56036D0E219}" type="slidenum">
+              <a:rPr lang="en-US" smtClean="0"/>
+              <a:t>3</a:t>
+            </a:fld>
+            <a:endParaRPr lang="en-US"/>
+          </a:p>
+        </p:txBody>
+      </p:sp>
+    </p:spTree>
+    <p:extLst>
+      <p:ext uri="{BB962C8B-B14F-4D97-AF65-F5344CB8AC3E}">
+        <p14:creationId xmlns:p14="http://schemas.microsoft.com/office/powerpoint/2010/main" val="1532237605"/>
+      </p:ext>
+    </p:extLst>
+  </p:cSld>
+  <p:clrMapOvr>
+    <a:masterClrMapping/>
+  </p:clrMapOvr>
+</p:notes>
+</file>
+
+<file path=ppt/notesSlides/notesSlide3.xml><?xml version="1.0" encoding="utf-8"?>
+<p:notes xmlns:a="http://schemas.openxmlformats.org/drawingml/2006/main" xmlns:r="http://schemas.openxmlformats.org/officeDocument/2006/relationships" xmlns:p="http://schemas.openxmlformats.org/presentationml/2006/main">
+  <p:cSld>
+    <p:spTree>
+      <p:nvGrpSpPr>
+        <p:cNvPr id="1" name=""/>
+        <p:cNvGrpSpPr/>
+        <p:nvPr/>
+      </p:nvGrpSpPr>
+      <p:grpSpPr>
+        <a:xfrm>
+          <a:off x="0" y="0"/>
+          <a:ext cx="0" cy="0"/>
+          <a:chOff x="0" y="0"/>
+          <a:chExt cx="0" cy="0"/>
+        </a:xfrm>
+      </p:grpSpPr>
+      <p:sp>
+        <p:nvSpPr>
+          <p:cNvPr id="2" name="Slide Image Placeholder 1"/>
+          <p:cNvSpPr>
+            <a:spLocks noGrp="1" noRot="1" noChangeAspect="1"/>
+          </p:cNvSpPr>
+          <p:nvPr>
+            <p:ph type="sldImg"/>
+          </p:nvPr>
+        </p:nvSpPr>
+        <p:spPr/>
+      </p:sp>
+      <p:sp>
+        <p:nvSpPr>
+          <p:cNvPr id="3" name="Notes Placeholder 2"/>
+          <p:cNvSpPr>
+            <a:spLocks noGrp="1"/>
+          </p:cNvSpPr>
+          <p:nvPr>
+            <p:ph type="body" idx="1"/>
+          </p:nvPr>
+        </p:nvSpPr>
+        <p:spPr/>
+        <p:txBody>
+          <a:bodyPr/>
+          <a:lstStyle/>
+          <a:p>
+            <a:pPr marL="171450" indent="-171450">
+              <a:buFontTx/>
+              <a:buChar char="-"/>
+            </a:pPr>
+            <a:r>
+              <a:rPr lang="en-US" dirty="0"/>
+              <a:t>The king model</a:t>
+            </a:r>
+          </a:p>
+          <a:p>
+            <a:pPr marL="171450" indent="-171450">
+              <a:buFontTx/>
+              <a:buChar char="-"/>
+            </a:pPr>
+            <a:r>
+              <a:rPr lang="en-US" dirty="0"/>
+              <a:t>Covers the structure of a scientific paper</a:t>
+            </a:r>
+          </a:p>
+        </p:txBody>
+      </p:sp>
+      <p:sp>
+        <p:nvSpPr>
+          <p:cNvPr id="4" name="Slide Number Placeholder 3"/>
+          <p:cNvSpPr>
+            <a:spLocks noGrp="1"/>
+          </p:cNvSpPr>
+          <p:nvPr>
+            <p:ph type="sldNum" sz="quarter" idx="5"/>
+          </p:nvPr>
+        </p:nvSpPr>
+        <p:spPr/>
+        <p:txBody>
+          <a:bodyPr/>
+          <a:lstStyle/>
+          <a:p>
+            <a:fld id="{E67F6501-D017-415D-B9A8-B56036D0E219}" type="slidenum">
+              <a:rPr lang="en-US" smtClean="0"/>
+              <a:t>4</a:t>
+            </a:fld>
+            <a:endParaRPr lang="en-US"/>
+          </a:p>
+        </p:txBody>
+      </p:sp>
+    </p:spTree>
+    <p:extLst>
+      <p:ext uri="{BB962C8B-B14F-4D97-AF65-F5344CB8AC3E}">
+        <p14:creationId xmlns:p14="http://schemas.microsoft.com/office/powerpoint/2010/main" val="4256417949"/>
+      </p:ext>
+    </p:extLst>
+  </p:cSld>
+  <p:clrMapOvr>
+    <a:masterClrMapping/>
+  </p:clrMapOvr>
+</p:notes>
+</file>
+
+<file path=ppt/notesSlides/notesSlide4.xml><?xml version="1.0" encoding="utf-8"?>
+<p:notes xmlns:a="http://schemas.openxmlformats.org/drawingml/2006/main" xmlns:r="http://schemas.openxmlformats.org/officeDocument/2006/relationships" xmlns:p="http://schemas.openxmlformats.org/presentationml/2006/main">
+  <p:cSld>
+    <p:spTree>
+      <p:nvGrpSpPr>
+        <p:cNvPr id="1" name=""/>
+        <p:cNvGrpSpPr/>
+        <p:nvPr/>
+      </p:nvGrpSpPr>
+      <p:grpSpPr>
+        <a:xfrm>
+          <a:off x="0" y="0"/>
+          <a:ext cx="0" cy="0"/>
+          <a:chOff x="0" y="0"/>
+          <a:chExt cx="0" cy="0"/>
+        </a:xfrm>
+      </p:grpSpPr>
+      <p:sp>
+        <p:nvSpPr>
+          <p:cNvPr id="2" name="Slide Image Placeholder 1"/>
+          <p:cNvSpPr>
+            <a:spLocks noGrp="1" noRot="1" noChangeAspect="1"/>
+          </p:cNvSpPr>
+          <p:nvPr>
+            <p:ph type="sldImg"/>
+          </p:nvPr>
+        </p:nvSpPr>
+        <p:spPr/>
+      </p:sp>
+      <p:sp>
+        <p:nvSpPr>
+          <p:cNvPr id="3" name="Notes Placeholder 2"/>
+          <p:cNvSpPr>
+            <a:spLocks noGrp="1"/>
+          </p:cNvSpPr>
+          <p:nvPr>
+            <p:ph type="body" idx="1"/>
+          </p:nvPr>
+        </p:nvSpPr>
+        <p:spPr/>
+        <p:txBody>
+          <a:bodyPr/>
+          <a:lstStyle/>
+          <a:p>
+            <a:pPr marL="171450" indent="-171450">
+              <a:buFontTx/>
+              <a:buChar char="-"/>
+            </a:pPr>
+            <a:r>
+              <a:rPr lang="en-US" dirty="0"/>
+              <a:t>Attention-grabbing</a:t>
+            </a:r>
+          </a:p>
+          <a:p>
+            <a:pPr marL="171450" indent="-171450">
+              <a:buFontTx/>
+              <a:buChar char="-"/>
+            </a:pPr>
+            <a:r>
+              <a:rPr lang="en-US" dirty="0"/>
+              <a:t>Clear and concise summary of the paper</a:t>
+            </a:r>
+          </a:p>
+          <a:p>
+            <a:pPr marL="171450" indent="-171450">
+              <a:buFontTx/>
+              <a:buChar char="-"/>
+            </a:pPr>
+            <a:r>
+              <a:rPr lang="en-US" dirty="0"/>
+              <a:t>It should be clear what is the purpose of the research</a:t>
+            </a:r>
+          </a:p>
+          <a:p>
+            <a:pPr marL="171450" indent="-171450">
+              <a:buFontTx/>
+              <a:buChar char="-"/>
+            </a:pPr>
+            <a:r>
+              <a:rPr lang="en-US" dirty="0"/>
+              <a:t>It is important to use key terms, but not jargon</a:t>
+            </a:r>
+          </a:p>
+          <a:p>
+            <a:pPr marL="171450" indent="-171450">
+              <a:buFontTx/>
+              <a:buChar char="-"/>
+            </a:pPr>
+            <a:r>
+              <a:rPr lang="en-US" dirty="0"/>
+              <a:t>If jargon is used, the target audience should be considered</a:t>
+            </a:r>
+          </a:p>
+          <a:p>
+            <a:pPr marL="171450" indent="-171450">
+              <a:buFontTx/>
+              <a:buChar char="-"/>
+            </a:pPr>
+            <a:r>
+              <a:rPr lang="en-US" dirty="0"/>
+              <a:t>It is important to invest time in designing the title as it can have a significant impact on the reader</a:t>
+            </a:r>
+          </a:p>
+          <a:p>
+            <a:pPr marL="171450" indent="-171450">
+              <a:buFontTx/>
+              <a:buChar char="-"/>
+            </a:pPr>
+            <a:endParaRPr lang="en-US" dirty="0"/>
+          </a:p>
+        </p:txBody>
+      </p:sp>
+      <p:sp>
+        <p:nvSpPr>
+          <p:cNvPr id="4" name="Slide Number Placeholder 3"/>
+          <p:cNvSpPr>
+            <a:spLocks noGrp="1"/>
+          </p:cNvSpPr>
+          <p:nvPr>
+            <p:ph type="sldNum" sz="quarter" idx="5"/>
+          </p:nvPr>
+        </p:nvSpPr>
+        <p:spPr/>
+        <p:txBody>
+          <a:bodyPr/>
+          <a:lstStyle/>
+          <a:p>
+            <a:fld id="{E67F6501-D017-415D-B9A8-B56036D0E219}" type="slidenum">
+              <a:rPr lang="en-US" smtClean="0"/>
+              <a:t>5</a:t>
+            </a:fld>
+            <a:endParaRPr lang="en-US"/>
+          </a:p>
+        </p:txBody>
+      </p:sp>
+    </p:spTree>
+    <p:extLst>
+      <p:ext uri="{BB962C8B-B14F-4D97-AF65-F5344CB8AC3E}">
+        <p14:creationId xmlns:p14="http://schemas.microsoft.com/office/powerpoint/2010/main" val="3025154495"/>
+      </p:ext>
+    </p:extLst>
+  </p:cSld>
+  <p:clrMapOvr>
+    <a:masterClrMapping/>
+  </p:clrMapOvr>
+</p:notes>
+</file>
+
+<file path=ppt/notesSlides/notesSlide5.xml><?xml version="1.0" encoding="utf-8"?>
+<p:notes xmlns:a="http://schemas.openxmlformats.org/drawingml/2006/main" xmlns:r="http://schemas.openxmlformats.org/officeDocument/2006/relationships" xmlns:p="http://schemas.openxmlformats.org/presentationml/2006/main">
+  <p:cSld>
+    <p:spTree>
+      <p:nvGrpSpPr>
+        <p:cNvPr id="1" name=""/>
+        <p:cNvGrpSpPr/>
+        <p:nvPr/>
+      </p:nvGrpSpPr>
+      <p:grpSpPr>
+        <a:xfrm>
+          <a:off x="0" y="0"/>
+          <a:ext cx="0" cy="0"/>
+          <a:chOff x="0" y="0"/>
+          <a:chExt cx="0" cy="0"/>
+        </a:xfrm>
+      </p:grpSpPr>
+      <p:sp>
+        <p:nvSpPr>
+          <p:cNvPr id="2" name="Slide Image Placeholder 1"/>
+          <p:cNvSpPr>
+            <a:spLocks noGrp="1" noRot="1" noChangeAspect="1"/>
+          </p:cNvSpPr>
+          <p:nvPr>
+            <p:ph type="sldImg"/>
+          </p:nvPr>
+        </p:nvSpPr>
+        <p:spPr/>
+      </p:sp>
+      <p:sp>
+        <p:nvSpPr>
+          <p:cNvPr id="3" name="Notes Placeholder 2"/>
+          <p:cNvSpPr>
+            <a:spLocks noGrp="1"/>
+          </p:cNvSpPr>
+          <p:nvPr>
+            <p:ph type="body" idx="1"/>
+          </p:nvPr>
+        </p:nvSpPr>
+        <p:spPr/>
+        <p:txBody>
+          <a:bodyPr/>
+          <a:lstStyle/>
+          <a:p>
+            <a:pPr marL="171450" indent="-171450">
+              <a:buFontTx/>
+              <a:buChar char="-"/>
+            </a:pPr>
+            <a:r>
+              <a:rPr lang="en-US" dirty="0"/>
+              <a:t>Essentially a summary of the paper aim, results and conclusions</a:t>
+            </a:r>
+          </a:p>
+          <a:p>
+            <a:pPr marL="171450" indent="-171450">
+              <a:buFontTx/>
+              <a:buChar char="-"/>
+            </a:pPr>
+            <a:r>
+              <a:rPr lang="en-US" dirty="0"/>
+              <a:t>Compressed hourglass model</a:t>
+            </a:r>
+          </a:p>
+          <a:p>
+            <a:pPr marL="171450" indent="-171450">
+              <a:buFontTx/>
+              <a:buChar char="-"/>
+            </a:pPr>
+            <a:r>
+              <a:rPr lang="en-US" dirty="0"/>
+              <a:t>No references</a:t>
+            </a:r>
+          </a:p>
+          <a:p>
+            <a:pPr marL="171450" indent="-171450">
+              <a:buFontTx/>
+              <a:buChar char="-"/>
+            </a:pPr>
+            <a:r>
+              <a:rPr lang="en-US" dirty="0"/>
+              <a:t>Not too lengthy</a:t>
+            </a:r>
+          </a:p>
+          <a:p>
+            <a:pPr marL="171450" indent="-171450">
+              <a:buFontTx/>
+              <a:buChar char="-"/>
+            </a:pPr>
+            <a:r>
+              <a:rPr lang="en-US" dirty="0"/>
+              <a:t>Usually written after the rest, but some write it first to have an idea</a:t>
+            </a:r>
+          </a:p>
+          <a:p>
+            <a:pPr marL="171450" indent="-171450">
+              <a:buFontTx/>
+              <a:buChar char="-"/>
+            </a:pPr>
+            <a:r>
+              <a:rPr lang="en-US" dirty="0"/>
+              <a:t>Goes from general to specific and back to general</a:t>
+            </a:r>
+          </a:p>
+          <a:p>
+            <a:pPr marL="171450" indent="-171450">
+              <a:buFontTx/>
+              <a:buChar char="-"/>
+            </a:pPr>
+            <a:endParaRPr lang="en-US" dirty="0"/>
+          </a:p>
+        </p:txBody>
+      </p:sp>
+      <p:sp>
+        <p:nvSpPr>
+          <p:cNvPr id="4" name="Slide Number Placeholder 3"/>
+          <p:cNvSpPr>
+            <a:spLocks noGrp="1"/>
+          </p:cNvSpPr>
+          <p:nvPr>
+            <p:ph type="sldNum" sz="quarter" idx="5"/>
+          </p:nvPr>
+        </p:nvSpPr>
+        <p:spPr/>
+        <p:txBody>
+          <a:bodyPr/>
+          <a:lstStyle/>
+          <a:p>
+            <a:fld id="{E67F6501-D017-415D-B9A8-B56036D0E219}" type="slidenum">
+              <a:rPr lang="en-US" smtClean="0"/>
+              <a:t>6</a:t>
+            </a:fld>
+            <a:endParaRPr lang="en-US"/>
+          </a:p>
+        </p:txBody>
+      </p:sp>
+    </p:spTree>
+    <p:extLst>
+      <p:ext uri="{BB962C8B-B14F-4D97-AF65-F5344CB8AC3E}">
+        <p14:creationId xmlns:p14="http://schemas.microsoft.com/office/powerpoint/2010/main" val="2347241981"/>
+      </p:ext>
+    </p:extLst>
+  </p:cSld>
+  <p:clrMapOvr>
+    <a:masterClrMapping/>
+  </p:clrMapOvr>
+</p:notes>
+</file>
+
+<file path=ppt/notesSlides/notesSlide6.xml><?xml version="1.0" encoding="utf-8"?>
+<p:notes xmlns:a="http://schemas.openxmlformats.org/drawingml/2006/main" xmlns:r="http://schemas.openxmlformats.org/officeDocument/2006/relationships" xmlns:p="http://schemas.openxmlformats.org/presentationml/2006/main">
+  <p:cSld>
+    <p:spTree>
+      <p:nvGrpSpPr>
+        <p:cNvPr id="1" name=""/>
+        <p:cNvGrpSpPr/>
+        <p:nvPr/>
+      </p:nvGrpSpPr>
+      <p:grpSpPr>
+        <a:xfrm>
+          <a:off x="0" y="0"/>
+          <a:ext cx="0" cy="0"/>
+          <a:chOff x="0" y="0"/>
+          <a:chExt cx="0" cy="0"/>
+        </a:xfrm>
+      </p:grpSpPr>
+      <p:sp>
+        <p:nvSpPr>
+          <p:cNvPr id="2" name="Slide Image Placeholder 1"/>
+          <p:cNvSpPr>
+            <a:spLocks noGrp="1" noRot="1" noChangeAspect="1"/>
+          </p:cNvSpPr>
+          <p:nvPr>
+            <p:ph type="sldImg"/>
+          </p:nvPr>
+        </p:nvSpPr>
+        <p:spPr/>
+      </p:sp>
+      <p:sp>
+        <p:nvSpPr>
+          <p:cNvPr id="3" name="Notes Placeholder 2"/>
+          <p:cNvSpPr>
+            <a:spLocks noGrp="1"/>
+          </p:cNvSpPr>
+          <p:nvPr>
+            <p:ph type="body" idx="1"/>
+          </p:nvPr>
+        </p:nvSpPr>
+        <p:spPr/>
+        <p:txBody>
+          <a:bodyPr/>
+          <a:lstStyle/>
+          <a:p>
+            <a:pPr marL="171450" indent="-171450">
+              <a:buFontTx/>
+              <a:buChar char="-"/>
+            </a:pPr>
+            <a:r>
+              <a:rPr lang="en-US" dirty="0"/>
+              <a:t>First section of the actual paper, starting from a general, and introducing the specifics</a:t>
+            </a:r>
+          </a:p>
+          <a:p>
+            <a:pPr marL="171450" indent="-171450">
+              <a:buFontTx/>
+              <a:buChar char="-"/>
+            </a:pPr>
+            <a:r>
+              <a:rPr lang="en-US" dirty="0"/>
+              <a:t>Should provide background</a:t>
+            </a:r>
+          </a:p>
+          <a:p>
+            <a:pPr marL="171450" indent="-171450">
+              <a:buFontTx/>
+              <a:buChar char="-"/>
+            </a:pPr>
+            <a:r>
+              <a:rPr lang="en-US" dirty="0"/>
+              <a:t>Establish the importance of the paper</a:t>
+            </a:r>
+          </a:p>
+          <a:p>
+            <a:pPr marL="171450" indent="-171450">
+              <a:buFontTx/>
+              <a:buChar char="-"/>
+            </a:pPr>
+            <a:r>
+              <a:rPr lang="en-US" dirty="0"/>
+              <a:t>Clearly state the hypothesis </a:t>
+            </a:r>
+          </a:p>
+          <a:p>
+            <a:pPr marL="171450" indent="-171450">
+              <a:buFontTx/>
+              <a:buChar char="-"/>
+            </a:pPr>
+            <a:r>
+              <a:rPr lang="en-US" dirty="0"/>
+              <a:t>It can provide an overview of the structure of the paper</a:t>
+            </a:r>
+          </a:p>
+          <a:p>
+            <a:pPr marL="171450" indent="-171450">
+              <a:buFontTx/>
+              <a:buChar char="-"/>
+            </a:pPr>
+            <a:r>
+              <a:rPr lang="en-US" dirty="0"/>
+              <a:t>Should be interesting in order to encourage the reader to continue</a:t>
+            </a:r>
+          </a:p>
+        </p:txBody>
+      </p:sp>
+      <p:sp>
+        <p:nvSpPr>
+          <p:cNvPr id="4" name="Slide Number Placeholder 3"/>
+          <p:cNvSpPr>
+            <a:spLocks noGrp="1"/>
+          </p:cNvSpPr>
+          <p:nvPr>
+            <p:ph type="sldNum" sz="quarter" idx="5"/>
+          </p:nvPr>
+        </p:nvSpPr>
+        <p:spPr/>
+        <p:txBody>
+          <a:bodyPr/>
+          <a:lstStyle/>
+          <a:p>
+            <a:fld id="{E67F6501-D017-415D-B9A8-B56036D0E219}" type="slidenum">
+              <a:rPr lang="en-US" smtClean="0"/>
+              <a:t>7</a:t>
+            </a:fld>
+            <a:endParaRPr lang="en-US"/>
+          </a:p>
+        </p:txBody>
+      </p:sp>
+    </p:spTree>
+    <p:extLst>
+      <p:ext uri="{BB962C8B-B14F-4D97-AF65-F5344CB8AC3E}">
+        <p14:creationId xmlns:p14="http://schemas.microsoft.com/office/powerpoint/2010/main" val="3548543092"/>
+      </p:ext>
+    </p:extLst>
+  </p:cSld>
+  <p:clrMapOvr>
+    <a:masterClrMapping/>
+  </p:clrMapOvr>
+</p:notes>
+</file>
+
+<file path=ppt/notesSlides/notesSlide7.xml><?xml version="1.0" encoding="utf-8"?>
+<p:notes xmlns:a="http://schemas.openxmlformats.org/drawingml/2006/main" xmlns:r="http://schemas.openxmlformats.org/officeDocument/2006/relationships" xmlns:p="http://schemas.openxmlformats.org/presentationml/2006/main">
+  <p:cSld>
+    <p:spTree>
+      <p:nvGrpSpPr>
+        <p:cNvPr id="1" name=""/>
+        <p:cNvGrpSpPr/>
+        <p:nvPr/>
+      </p:nvGrpSpPr>
+      <p:grpSpPr>
+        <a:xfrm>
+          <a:off x="0" y="0"/>
+          <a:ext cx="0" cy="0"/>
+          <a:chOff x="0" y="0"/>
+          <a:chExt cx="0" cy="0"/>
+        </a:xfrm>
+      </p:grpSpPr>
+      <p:sp>
+        <p:nvSpPr>
+          <p:cNvPr id="2" name="Slide Image Placeholder 1"/>
+          <p:cNvSpPr>
+            <a:spLocks noGrp="1" noRot="1" noChangeAspect="1"/>
+          </p:cNvSpPr>
+          <p:nvPr>
+            <p:ph type="sldImg"/>
+          </p:nvPr>
+        </p:nvSpPr>
+        <p:spPr/>
+      </p:sp>
+      <p:sp>
+        <p:nvSpPr>
+          <p:cNvPr id="3" name="Notes Placeholder 2"/>
+          <p:cNvSpPr>
+            <a:spLocks noGrp="1"/>
+          </p:cNvSpPr>
+          <p:nvPr>
+            <p:ph type="body" idx="1"/>
+          </p:nvPr>
+        </p:nvSpPr>
+        <p:spPr/>
+        <p:txBody>
+          <a:bodyPr/>
+          <a:lstStyle/>
+          <a:p>
+            <a:pPr marL="171450" indent="-171450">
+              <a:buFontTx/>
+              <a:buChar char="-"/>
+            </a:pPr>
+            <a:r>
+              <a:rPr lang="en-US" dirty="0"/>
+              <a:t>Next is the body, which, as we can see it is slim, therefore specific</a:t>
+            </a:r>
+          </a:p>
+          <a:p>
+            <a:pPr marL="171450" indent="-171450">
+              <a:buFontTx/>
+              <a:buChar char="-"/>
+            </a:pPr>
+            <a:r>
+              <a:rPr lang="en-US" dirty="0"/>
+              <a:t>Backbone of the paper</a:t>
+            </a:r>
+          </a:p>
+          <a:p>
+            <a:pPr marL="171450" indent="-171450">
+              <a:buFontTx/>
+              <a:buChar char="-"/>
+            </a:pPr>
+            <a:r>
+              <a:rPr lang="en-US" dirty="0"/>
+              <a:t>Highlights the key points of the research</a:t>
+            </a:r>
+          </a:p>
+          <a:p>
+            <a:pPr marL="171450" indent="-171450">
+              <a:buFontTx/>
+              <a:buChar char="-"/>
+            </a:pPr>
+            <a:r>
+              <a:rPr lang="en-US" dirty="0"/>
+              <a:t>In the context of machine learning</a:t>
+            </a:r>
+          </a:p>
+          <a:p>
+            <a:pPr marL="171450" indent="-171450">
+              <a:buFontTx/>
+              <a:buChar char="-"/>
+            </a:pPr>
+            <a:r>
+              <a:rPr lang="en-US" dirty="0"/>
+              <a:t>Literature review in which other relevant methods are presented</a:t>
+            </a:r>
+          </a:p>
+          <a:p>
+            <a:pPr marL="171450" indent="-171450">
+              <a:buFontTx/>
+              <a:buChar char="-"/>
+            </a:pPr>
+            <a:r>
+              <a:rPr lang="en-US" dirty="0"/>
+              <a:t>The method or learning algorithm</a:t>
+            </a:r>
+          </a:p>
+          <a:p>
+            <a:pPr marL="171450" indent="-171450">
+              <a:buFontTx/>
+              <a:buChar char="-"/>
+            </a:pPr>
+            <a:r>
+              <a:rPr lang="en-US" dirty="0"/>
+              <a:t>Methodology how to apply the method – processing of the data, training loop, hyperparameter search</a:t>
+            </a:r>
+          </a:p>
+          <a:p>
+            <a:pPr marL="171450" indent="-171450">
+              <a:buFontTx/>
+              <a:buChar char="-"/>
+            </a:pPr>
+            <a:r>
+              <a:rPr lang="en-US" dirty="0"/>
+              <a:t>Result and comparison with the existing literature important to use the same metrics on the same data</a:t>
+            </a:r>
+          </a:p>
+          <a:p>
+            <a:pPr marL="171450" indent="-171450">
+              <a:buFontTx/>
+              <a:buChar char="-"/>
+            </a:pPr>
+            <a:endParaRPr lang="en-US" dirty="0"/>
+          </a:p>
+        </p:txBody>
+      </p:sp>
+      <p:sp>
+        <p:nvSpPr>
+          <p:cNvPr id="4" name="Slide Number Placeholder 3"/>
+          <p:cNvSpPr>
+            <a:spLocks noGrp="1"/>
+          </p:cNvSpPr>
+          <p:nvPr>
+            <p:ph type="sldNum" sz="quarter" idx="5"/>
+          </p:nvPr>
+        </p:nvSpPr>
+        <p:spPr/>
+        <p:txBody>
+          <a:bodyPr/>
+          <a:lstStyle/>
+          <a:p>
+            <a:fld id="{E67F6501-D017-415D-B9A8-B56036D0E219}" type="slidenum">
+              <a:rPr lang="en-US" smtClean="0"/>
+              <a:t>8</a:t>
+            </a:fld>
+            <a:endParaRPr lang="en-US"/>
+          </a:p>
+        </p:txBody>
+      </p:sp>
+    </p:spTree>
+    <p:extLst>
+      <p:ext uri="{BB962C8B-B14F-4D97-AF65-F5344CB8AC3E}">
+        <p14:creationId xmlns:p14="http://schemas.microsoft.com/office/powerpoint/2010/main" val="313409353"/>
+      </p:ext>
+    </p:extLst>
+  </p:cSld>
+  <p:clrMapOvr>
+    <a:masterClrMapping/>
+  </p:clrMapOvr>
+</p:notes>
+</file>
+
+<file path=ppt/notesSlides/notesSlide8.xml><?xml version="1.0" encoding="utf-8"?>
+<p:notes xmlns:a="http://schemas.openxmlformats.org/drawingml/2006/main" xmlns:r="http://schemas.openxmlformats.org/officeDocument/2006/relationships" xmlns:p="http://schemas.openxmlformats.org/presentationml/2006/main">
+  <p:cSld>
+    <p:spTree>
+      <p:nvGrpSpPr>
+        <p:cNvPr id="1" name=""/>
+        <p:cNvGrpSpPr/>
+        <p:nvPr/>
+      </p:nvGrpSpPr>
+      <p:grpSpPr>
+        <a:xfrm>
+          <a:off x="0" y="0"/>
+          <a:ext cx="0" cy="0"/>
+          <a:chOff x="0" y="0"/>
+          <a:chExt cx="0" cy="0"/>
+        </a:xfrm>
+      </p:grpSpPr>
+      <p:sp>
+        <p:nvSpPr>
+          <p:cNvPr id="2" name="Slide Image Placeholder 1"/>
+          <p:cNvSpPr>
+            <a:spLocks noGrp="1" noRot="1" noChangeAspect="1"/>
+          </p:cNvSpPr>
+          <p:nvPr>
+            <p:ph type="sldImg"/>
+          </p:nvPr>
+        </p:nvSpPr>
+        <p:spPr/>
+      </p:sp>
+      <p:sp>
+        <p:nvSpPr>
+          <p:cNvPr id="3" name="Notes Placeholder 2"/>
+          <p:cNvSpPr>
+            <a:spLocks noGrp="1"/>
+          </p:cNvSpPr>
+          <p:nvPr>
+            <p:ph type="body" idx="1"/>
+          </p:nvPr>
+        </p:nvSpPr>
+        <p:spPr/>
+        <p:txBody>
+          <a:bodyPr/>
+          <a:lstStyle/>
+          <a:p>
+            <a:pPr marL="171450" indent="-171450">
+              <a:buFontTx/>
+              <a:buChar char="-"/>
+            </a:pPr>
+            <a:r>
+              <a:rPr lang="en-US" dirty="0"/>
+              <a:t>Ending part</a:t>
+            </a:r>
+          </a:p>
+          <a:p>
+            <a:pPr marL="171450" indent="-171450">
+              <a:buFontTx/>
+              <a:buChar char="-"/>
+            </a:pPr>
+            <a:r>
+              <a:rPr lang="en-US" dirty="0"/>
+              <a:t>Goes from specific to general</a:t>
+            </a:r>
+          </a:p>
+          <a:p>
+            <a:pPr marL="171450" indent="-171450">
+              <a:buFontTx/>
+              <a:buChar char="-"/>
+            </a:pPr>
+            <a:r>
+              <a:rPr lang="en-US" dirty="0"/>
+              <a:t>Meaning that the main findings should be presented and try to place them in the bigger picture</a:t>
+            </a:r>
+          </a:p>
+          <a:p>
+            <a:pPr marL="171450" indent="-171450">
+              <a:buFontTx/>
+              <a:buChar char="-"/>
+            </a:pPr>
+            <a:r>
+              <a:rPr lang="en-US" dirty="0"/>
+              <a:t>Future work, limitations of the study</a:t>
+            </a:r>
+          </a:p>
+        </p:txBody>
+      </p:sp>
+      <p:sp>
+        <p:nvSpPr>
+          <p:cNvPr id="4" name="Slide Number Placeholder 3"/>
+          <p:cNvSpPr>
+            <a:spLocks noGrp="1"/>
+          </p:cNvSpPr>
+          <p:nvPr>
+            <p:ph type="sldNum" sz="quarter" idx="5"/>
+          </p:nvPr>
+        </p:nvSpPr>
+        <p:spPr/>
+        <p:txBody>
+          <a:bodyPr/>
+          <a:lstStyle/>
+          <a:p>
+            <a:fld id="{E67F6501-D017-415D-B9A8-B56036D0E219}" type="slidenum">
+              <a:rPr lang="en-US" smtClean="0"/>
+              <a:t>9</a:t>
+            </a:fld>
+            <a:endParaRPr lang="en-US"/>
+          </a:p>
+        </p:txBody>
+      </p:sp>
+    </p:spTree>
+    <p:extLst>
+      <p:ext uri="{BB962C8B-B14F-4D97-AF65-F5344CB8AC3E}">
+        <p14:creationId xmlns:p14="http://schemas.microsoft.com/office/powerpoint/2010/main" val="3554949616"/>
+      </p:ext>
+    </p:extLst>
+  </p:cSld>
+  <p:clrMapOvr>
+    <a:masterClrMapping/>
+  </p:clrMapOvr>
+</p:notes>
+</file>
+
+<file path=ppt/notesSlides/notesSlide9.xml><?xml version="1.0" encoding="utf-8"?>
+<p:notes xmlns:a="http://schemas.openxmlformats.org/drawingml/2006/main" xmlns:r="http://schemas.openxmlformats.org/officeDocument/2006/relationships" xmlns:p="http://schemas.openxmlformats.org/presentationml/2006/main">
+  <p:cSld>
+    <p:spTree>
+      <p:nvGrpSpPr>
+        <p:cNvPr id="1" name=""/>
+        <p:cNvGrpSpPr/>
+        <p:nvPr/>
+      </p:nvGrpSpPr>
+      <p:grpSpPr>
+        <a:xfrm>
+          <a:off x="0" y="0"/>
+          <a:ext cx="0" cy="0"/>
+          <a:chOff x="0" y="0"/>
+          <a:chExt cx="0" cy="0"/>
+        </a:xfrm>
+      </p:grpSpPr>
+      <p:sp>
+        <p:nvSpPr>
+          <p:cNvPr id="2" name="Slide Image Placeholder 1"/>
+          <p:cNvSpPr>
+            <a:spLocks noGrp="1" noRot="1" noChangeAspect="1"/>
+          </p:cNvSpPr>
+          <p:nvPr>
+            <p:ph type="sldImg"/>
+          </p:nvPr>
+        </p:nvSpPr>
+        <p:spPr/>
+      </p:sp>
+      <p:sp>
+        <p:nvSpPr>
+          <p:cNvPr id="3" name="Notes Placeholder 2"/>
+          <p:cNvSpPr>
+            <a:spLocks noGrp="1"/>
+          </p:cNvSpPr>
+          <p:nvPr>
+            <p:ph type="body" idx="1"/>
+          </p:nvPr>
+        </p:nvSpPr>
+        <p:spPr/>
+        <p:txBody>
+          <a:bodyPr/>
+          <a:lstStyle/>
+          <a:p>
+            <a:pPr marL="171450" indent="-171450">
+              <a:buFontTx/>
+              <a:buChar char="-"/>
+            </a:pPr>
+            <a:r>
+              <a:rPr lang="en-US" dirty="0"/>
+              <a:t>List of works that are important for the research</a:t>
+            </a:r>
+          </a:p>
+          <a:p>
+            <a:pPr marL="171450" indent="-171450">
+              <a:buFontTx/>
+              <a:buChar char="-"/>
+            </a:pPr>
+            <a:r>
+              <a:rPr lang="en-US" dirty="0"/>
+              <a:t>Have a specific format, containing various information such as the author or where and how it was published</a:t>
+            </a:r>
+          </a:p>
+          <a:p>
+            <a:pPr marL="171450" indent="-171450">
+              <a:buFontTx/>
+              <a:buChar char="-"/>
+            </a:pPr>
+            <a:r>
+              <a:rPr lang="en-US" dirty="0"/>
+              <a:t>Can be an indicator for the quality of the research</a:t>
+            </a:r>
+          </a:p>
+        </p:txBody>
+      </p:sp>
+      <p:sp>
+        <p:nvSpPr>
+          <p:cNvPr id="4" name="Slide Number Placeholder 3"/>
+          <p:cNvSpPr>
+            <a:spLocks noGrp="1"/>
+          </p:cNvSpPr>
+          <p:nvPr>
+            <p:ph type="sldNum" sz="quarter" idx="5"/>
+          </p:nvPr>
+        </p:nvSpPr>
+        <p:spPr/>
+        <p:txBody>
+          <a:bodyPr/>
+          <a:lstStyle/>
+          <a:p>
+            <a:fld id="{E67F6501-D017-415D-B9A8-B56036D0E219}" type="slidenum">
+              <a:rPr lang="en-US" smtClean="0"/>
+              <a:t>10</a:t>
+            </a:fld>
+            <a:endParaRPr lang="en-US"/>
+          </a:p>
+        </p:txBody>
+      </p:sp>
+    </p:spTree>
+    <p:extLst>
+      <p:ext uri="{BB962C8B-B14F-4D97-AF65-F5344CB8AC3E}">
+        <p14:creationId xmlns:p14="http://schemas.microsoft.com/office/powerpoint/2010/main" val="3174786792"/>
       </p:ext>
     </p:extLst>
   </p:cSld>
@@ -733,7 +2011,7 @@
           <a:p>
             <a:fld id="{81B8F32D-D8B6-4B9E-9CBF-DCAC30B7B93D}" type="datetimeFigureOut">
               <a:rPr lang="en-US" smtClean="0"/>
-              <a:t>1/11/2023</a:t>
+              <a:t>1/17/2023</a:t>
             </a:fld>
             <a:endParaRPr lang="en-US"/>
           </a:p>
@@ -1049,7 +2327,7 @@
           <a:p>
             <a:fld id="{81B8F32D-D8B6-4B9E-9CBF-DCAC30B7B93D}" type="datetimeFigureOut">
               <a:rPr lang="en-US" smtClean="0"/>
-              <a:t>1/11/2023</a:t>
+              <a:t>1/17/2023</a:t>
             </a:fld>
             <a:endParaRPr lang="en-US"/>
           </a:p>
@@ -1354,7 +2632,7 @@
           <a:p>
             <a:fld id="{81B8F32D-D8B6-4B9E-9CBF-DCAC30B7B93D}" type="datetimeFigureOut">
               <a:rPr lang="en-US" smtClean="0"/>
-              <a:t>1/11/2023</a:t>
+              <a:t>1/17/2023</a:t>
             </a:fld>
             <a:endParaRPr lang="en-US"/>
           </a:p>
@@ -1561,7 +2839,7 @@
           <a:p>
             <a:fld id="{81B8F32D-D8B6-4B9E-9CBF-DCAC30B7B93D}" type="datetimeFigureOut">
               <a:rPr lang="en-US" smtClean="0"/>
-              <a:t>1/11/2023</a:t>
+              <a:t>1/17/2023</a:t>
             </a:fld>
             <a:endParaRPr lang="en-US"/>
           </a:p>
@@ -1909,7 +3187,7 @@
           <a:p>
             <a:fld id="{81B8F32D-D8B6-4B9E-9CBF-DCAC30B7B93D}" type="datetimeFigureOut">
               <a:rPr lang="en-US" smtClean="0"/>
-              <a:t>1/11/2023</a:t>
+              <a:t>1/17/2023</a:t>
             </a:fld>
             <a:endParaRPr lang="en-US"/>
           </a:p>
@@ -2380,7 +3658,7 @@
           <a:p>
             <a:fld id="{81B8F32D-D8B6-4B9E-9CBF-DCAC30B7B93D}" type="datetimeFigureOut">
               <a:rPr lang="en-US" smtClean="0"/>
-              <a:t>1/11/2023</a:t>
+              <a:t>1/17/2023</a:t>
             </a:fld>
             <a:endParaRPr lang="en-US"/>
           </a:p>
@@ -2915,7 +4193,7 @@
           <a:p>
             <a:fld id="{81B8F32D-D8B6-4B9E-9CBF-DCAC30B7B93D}" type="datetimeFigureOut">
               <a:rPr lang="en-US" smtClean="0"/>
-              <a:t>1/11/2023</a:t>
+              <a:t>1/17/2023</a:t>
             </a:fld>
             <a:endParaRPr lang="en-US"/>
           </a:p>
@@ -3132,7 +4410,7 @@
           <a:p>
             <a:fld id="{81B8F32D-D8B6-4B9E-9CBF-DCAC30B7B93D}" type="datetimeFigureOut">
               <a:rPr lang="en-US" smtClean="0"/>
-              <a:t>1/11/2023</a:t>
+              <a:t>1/17/2023</a:t>
             </a:fld>
             <a:endParaRPr lang="en-US"/>
           </a:p>
@@ -3337,7 +4615,7 @@
           <a:p>
             <a:fld id="{81B8F32D-D8B6-4B9E-9CBF-DCAC30B7B93D}" type="datetimeFigureOut">
               <a:rPr lang="en-US" smtClean="0"/>
-              <a:t>1/11/2023</a:t>
+              <a:t>1/17/2023</a:t>
             </a:fld>
             <a:endParaRPr lang="en-US"/>
           </a:p>
@@ -3667,7 +4945,7 @@
           <a:p>
             <a:fld id="{81B8F32D-D8B6-4B9E-9CBF-DCAC30B7B93D}" type="datetimeFigureOut">
               <a:rPr lang="en-US" smtClean="0"/>
-              <a:t>1/11/2023</a:t>
+              <a:t>1/17/2023</a:t>
             </a:fld>
             <a:endParaRPr lang="en-US"/>
           </a:p>
@@ -3977,7 +5255,7 @@
           <a:p>
             <a:fld id="{81B8F32D-D8B6-4B9E-9CBF-DCAC30B7B93D}" type="datetimeFigureOut">
               <a:rPr lang="en-US" smtClean="0"/>
-              <a:t>1/11/2023</a:t>
+              <a:t>1/17/2023</a:t>
             </a:fld>
             <a:endParaRPr lang="en-US"/>
           </a:p>
@@ -4218,7 +5496,7 @@
             <a:fld id="{81B8F32D-D8B6-4B9E-9CBF-DCAC30B7B93D}" type="datetimeFigureOut">
               <a:rPr lang="en-US" smtClean="0"/>
               <a:pPr/>
-              <a:t>1/11/2023</a:t>
+              <a:t>1/17/2023</a:t>
             </a:fld>
             <a:endParaRPr lang="en-US" dirty="0"/>
           </a:p>
@@ -5290,7 +6568,7 @@
           <p:nvPr/>
         </p:nvPicPr>
         <p:blipFill rotWithShape="1">
-          <a:blip r:embed="rId2">
+          <a:blip r:embed="rId3">
             <a:alphaModFix amt="40000"/>
           </a:blip>
           <a:srcRect r="-1" b="15708"/>
@@ -5452,6 +6730,88 @@
           </a:fontRef>
         </p:style>
       </p:cxnSp>
+      <p:pic>
+        <p:nvPicPr>
+          <p:cNvPr id="3" name="Picture 2" descr="Diagram&#10;&#10;Description automatically generated">
+            <a:extLst>
+              <a:ext uri="{FF2B5EF4-FFF2-40B4-BE49-F238E27FC236}">
+                <a16:creationId xmlns:a16="http://schemas.microsoft.com/office/drawing/2014/main" id="{9EDE6A1D-B228-EEA9-7DBC-3888A9C0901F}"/>
+              </a:ext>
+            </a:extLst>
+          </p:cNvPr>
+          <p:cNvPicPr>
+            <a:picLocks noChangeAspect="1"/>
+          </p:cNvPicPr>
+          <p:nvPr/>
+        </p:nvPicPr>
+        <p:blipFill>
+          <a:blip r:embed="rId4">
+            <a:extLst>
+              <a:ext uri="{28A0092B-C50C-407E-A947-70E740481C1C}">
+                <a14:useLocalDpi xmlns:a14="http://schemas.microsoft.com/office/drawing/2010/main" val="0"/>
+              </a:ext>
+            </a:extLst>
+          </a:blip>
+          <a:stretch>
+            <a:fillRect/>
+          </a:stretch>
+        </p:blipFill>
+        <p:spPr>
+          <a:xfrm>
+            <a:off x="4007623" y="1480817"/>
+            <a:ext cx="5082273" cy="4645151"/>
+          </a:xfrm>
+          <a:prstGeom prst="rect">
+            <a:avLst/>
+          </a:prstGeom>
+        </p:spPr>
+      </p:pic>
+      <p:sp>
+        <p:nvSpPr>
+          <p:cNvPr id="4" name="Arrow: Right 3">
+            <a:extLst>
+              <a:ext uri="{FF2B5EF4-FFF2-40B4-BE49-F238E27FC236}">
+                <a16:creationId xmlns:a16="http://schemas.microsoft.com/office/drawing/2014/main" id="{9D577EF0-F27B-AFC0-2332-7FAC663F4D8B}"/>
+              </a:ext>
+            </a:extLst>
+          </p:cNvPr>
+          <p:cNvSpPr/>
+          <p:nvPr/>
+        </p:nvSpPr>
+        <p:spPr>
+          <a:xfrm>
+            <a:off x="3309890" y="5083568"/>
+            <a:ext cx="1619075" cy="587230"/>
+          </a:xfrm>
+          <a:prstGeom prst="rightArrow">
+            <a:avLst/>
+          </a:prstGeom>
+        </p:spPr>
+        <p:style>
+          <a:lnRef idx="2">
+            <a:schemeClr val="accent1">
+              <a:shade val="50000"/>
+            </a:schemeClr>
+          </a:lnRef>
+          <a:fillRef idx="1">
+            <a:schemeClr val="accent1"/>
+          </a:fillRef>
+          <a:effectRef idx="0">
+            <a:schemeClr val="accent1"/>
+          </a:effectRef>
+          <a:fontRef idx="minor">
+            <a:schemeClr val="lt1"/>
+          </a:fontRef>
+        </p:style>
+        <p:txBody>
+          <a:bodyPr rtlCol="0" anchor="ctr"/>
+          <a:lstStyle/>
+          <a:p>
+            <a:pPr algn="ctr"/>
+            <a:endParaRPr lang="en-US"/>
+          </a:p>
+        </p:txBody>
+      </p:sp>
     </p:spTree>
     <p:extLst>
       <p:ext uri="{BB962C8B-B14F-4D97-AF65-F5344CB8AC3E}">
@@ -5628,7 +6988,7 @@
           <p:nvPr/>
         </p:nvPicPr>
         <p:blipFill rotWithShape="1">
-          <a:blip r:embed="rId2">
+          <a:blip r:embed="rId3">
             <a:alphaModFix amt="40000"/>
           </a:blip>
           <a:srcRect r="-1" b="15708"/>
@@ -5790,6 +7150,66 @@
           </a:fontRef>
         </p:style>
       </p:cxnSp>
+      <p:pic>
+        <p:nvPicPr>
+          <p:cNvPr id="4" name="Picture 3">
+            <a:extLst>
+              <a:ext uri="{FF2B5EF4-FFF2-40B4-BE49-F238E27FC236}">
+                <a16:creationId xmlns:a16="http://schemas.microsoft.com/office/drawing/2014/main" id="{1A3DFBDD-D584-0FD5-BF00-3928AE3EEC00}"/>
+              </a:ext>
+            </a:extLst>
+          </p:cNvPr>
+          <p:cNvPicPr>
+            <a:picLocks noChangeAspect="1"/>
+          </p:cNvPicPr>
+          <p:nvPr/>
+        </p:nvPicPr>
+        <p:blipFill>
+          <a:blip r:embed="rId4"/>
+          <a:stretch>
+            <a:fillRect/>
+          </a:stretch>
+        </p:blipFill>
+        <p:spPr>
+          <a:xfrm>
+            <a:off x="331768" y="1945105"/>
+            <a:ext cx="5556041" cy="3046633"/>
+          </a:xfrm>
+          <a:prstGeom prst="rect">
+            <a:avLst/>
+          </a:prstGeom>
+        </p:spPr>
+      </p:pic>
+      <p:pic>
+        <p:nvPicPr>
+          <p:cNvPr id="6" name="Picture 5">
+            <a:extLst>
+              <a:ext uri="{FF2B5EF4-FFF2-40B4-BE49-F238E27FC236}">
+                <a16:creationId xmlns:a16="http://schemas.microsoft.com/office/drawing/2014/main" id="{AFC467ED-E656-2F02-767F-E490A9BBF1C4}"/>
+              </a:ext>
+            </a:extLst>
+          </p:cNvPr>
+          <p:cNvPicPr>
+            <a:picLocks noChangeAspect="1"/>
+          </p:cNvPicPr>
+          <p:nvPr/>
+        </p:nvPicPr>
+        <p:blipFill>
+          <a:blip r:embed="rId5"/>
+          <a:stretch>
+            <a:fillRect/>
+          </a:stretch>
+        </p:blipFill>
+        <p:spPr>
+          <a:xfrm>
+            <a:off x="6370389" y="1751021"/>
+            <a:ext cx="5271841" cy="3392206"/>
+          </a:xfrm>
+          <a:prstGeom prst="rect">
+            <a:avLst/>
+          </a:prstGeom>
+        </p:spPr>
+      </p:pic>
     </p:spTree>
     <p:extLst>
       <p:ext uri="{BB962C8B-B14F-4D97-AF65-F5344CB8AC3E}">
@@ -5966,7 +7386,7 @@
           <p:nvPr/>
         </p:nvPicPr>
         <p:blipFill rotWithShape="1">
-          <a:blip r:embed="rId2">
+          <a:blip r:embed="rId3">
             <a:alphaModFix amt="40000"/>
           </a:blip>
           <a:srcRect r="-1" b="15708"/>
@@ -6000,8 +7420,8 @@
         </p:nvSpPr>
         <p:spPr>
           <a:xfrm>
-            <a:off x="482600" y="732032"/>
-            <a:ext cx="11555520" cy="2736390"/>
+            <a:off x="407955" y="2513759"/>
+            <a:ext cx="11555520" cy="919485"/>
           </a:xfrm>
         </p:spPr>
         <p:txBody>
@@ -7066,7 +8486,7 @@
           <p:nvPr/>
         </p:nvPicPr>
         <p:blipFill rotWithShape="1">
-          <a:blip r:embed="rId2">
+          <a:blip r:embed="rId3">
             <a:alphaModFix amt="40000"/>
           </a:blip>
           <a:srcRect r="-1" b="15708"/>
@@ -7259,7 +8679,7 @@
           <p:nvPr/>
         </p:nvPicPr>
         <p:blipFill>
-          <a:blip r:embed="rId3">
+          <a:blip r:embed="rId4">
             <a:extLst>
               <a:ext uri="{28A0092B-C50C-407E-A947-70E740481C1C}">
                 <a14:useLocalDpi xmlns:a14="http://schemas.microsoft.com/office/drawing/2010/main" val="0"/>
@@ -7467,7 +8887,7 @@
           <p:nvPr/>
         </p:nvPicPr>
         <p:blipFill rotWithShape="1">
-          <a:blip r:embed="rId2">
+          <a:blip r:embed="rId3">
             <a:alphaModFix amt="40000"/>
           </a:blip>
           <a:srcRect r="-1" b="15708"/>
@@ -7651,7 +9071,7 @@
           <p:nvPr/>
         </p:nvPicPr>
         <p:blipFill>
-          <a:blip r:embed="rId3">
+          <a:blip r:embed="rId4">
             <a:extLst>
               <a:ext uri="{28A0092B-C50C-407E-A947-70E740481C1C}">
                 <a14:useLocalDpi xmlns:a14="http://schemas.microsoft.com/office/drawing/2010/main" val="0"/>
@@ -7848,7 +9268,7 @@
           <p:nvPr/>
         </p:nvPicPr>
         <p:blipFill rotWithShape="1">
-          <a:blip r:embed="rId2">
+          <a:blip r:embed="rId3">
             <a:alphaModFix amt="40000"/>
           </a:blip>
           <a:srcRect r="-1" b="15708"/>
@@ -8010,6 +9430,88 @@
           </a:fontRef>
         </p:style>
       </p:cxnSp>
+      <p:pic>
+        <p:nvPicPr>
+          <p:cNvPr id="3" name="Picture 2" descr="Diagram&#10;&#10;Description automatically generated">
+            <a:extLst>
+              <a:ext uri="{FF2B5EF4-FFF2-40B4-BE49-F238E27FC236}">
+                <a16:creationId xmlns:a16="http://schemas.microsoft.com/office/drawing/2014/main" id="{0EBB73F7-C988-06DE-B423-3ABD5D84B888}"/>
+              </a:ext>
+            </a:extLst>
+          </p:cNvPr>
+          <p:cNvPicPr>
+            <a:picLocks noChangeAspect="1"/>
+          </p:cNvPicPr>
+          <p:nvPr/>
+        </p:nvPicPr>
+        <p:blipFill>
+          <a:blip r:embed="rId4">
+            <a:extLst>
+              <a:ext uri="{28A0092B-C50C-407E-A947-70E740481C1C}">
+                <a14:useLocalDpi xmlns:a14="http://schemas.microsoft.com/office/drawing/2010/main" val="0"/>
+              </a:ext>
+            </a:extLst>
+          </a:blip>
+          <a:stretch>
+            <a:fillRect/>
+          </a:stretch>
+        </p:blipFill>
+        <p:spPr>
+          <a:xfrm>
+            <a:off x="4007623" y="1480817"/>
+            <a:ext cx="5082273" cy="4645151"/>
+          </a:xfrm>
+          <a:prstGeom prst="rect">
+            <a:avLst/>
+          </a:prstGeom>
+        </p:spPr>
+      </p:pic>
+      <p:sp>
+        <p:nvSpPr>
+          <p:cNvPr id="4" name="Arrow: Right 3">
+            <a:extLst>
+              <a:ext uri="{FF2B5EF4-FFF2-40B4-BE49-F238E27FC236}">
+                <a16:creationId xmlns:a16="http://schemas.microsoft.com/office/drawing/2014/main" id="{0740ABE2-CD41-CFF3-3BC1-6B4E666FE12B}"/>
+              </a:ext>
+            </a:extLst>
+          </p:cNvPr>
+          <p:cNvSpPr/>
+          <p:nvPr/>
+        </p:nvSpPr>
+        <p:spPr>
+          <a:xfrm rot="1373195">
+            <a:off x="3907251" y="1066117"/>
+            <a:ext cx="1619075" cy="587230"/>
+          </a:xfrm>
+          <a:prstGeom prst="rightArrow">
+            <a:avLst/>
+          </a:prstGeom>
+        </p:spPr>
+        <p:style>
+          <a:lnRef idx="2">
+            <a:schemeClr val="accent1">
+              <a:shade val="50000"/>
+            </a:schemeClr>
+          </a:lnRef>
+          <a:fillRef idx="1">
+            <a:schemeClr val="accent1"/>
+          </a:fillRef>
+          <a:effectRef idx="0">
+            <a:schemeClr val="accent1"/>
+          </a:effectRef>
+          <a:fontRef idx="minor">
+            <a:schemeClr val="lt1"/>
+          </a:fontRef>
+        </p:style>
+        <p:txBody>
+          <a:bodyPr rtlCol="0" anchor="ctr"/>
+          <a:lstStyle/>
+          <a:p>
+            <a:pPr algn="ctr"/>
+            <a:endParaRPr lang="en-US"/>
+          </a:p>
+        </p:txBody>
+      </p:sp>
     </p:spTree>
     <p:extLst>
       <p:ext uri="{BB962C8B-B14F-4D97-AF65-F5344CB8AC3E}">
@@ -8186,7 +9688,7 @@
           <p:nvPr/>
         </p:nvPicPr>
         <p:blipFill rotWithShape="1">
-          <a:blip r:embed="rId2">
+          <a:blip r:embed="rId3">
             <a:alphaModFix amt="40000"/>
           </a:blip>
           <a:srcRect r="-1" b="15708"/>
@@ -8194,7 +9696,7 @@
         </p:blipFill>
         <p:spPr>
           <a:xfrm>
-            <a:off x="20" y="10"/>
+            <a:off x="20" y="8399"/>
             <a:ext cx="12188932" cy="6857990"/>
           </a:xfrm>
           <a:prstGeom prst="rect">
@@ -8348,6 +9850,88 @@
           </a:fontRef>
         </p:style>
       </p:cxnSp>
+      <p:pic>
+        <p:nvPicPr>
+          <p:cNvPr id="3" name="Picture 2" descr="Diagram&#10;&#10;Description automatically generated">
+            <a:extLst>
+              <a:ext uri="{FF2B5EF4-FFF2-40B4-BE49-F238E27FC236}">
+                <a16:creationId xmlns:a16="http://schemas.microsoft.com/office/drawing/2014/main" id="{1A7AF604-8159-1233-AC2B-C2064E75C19F}"/>
+              </a:ext>
+            </a:extLst>
+          </p:cNvPr>
+          <p:cNvPicPr>
+            <a:picLocks noChangeAspect="1"/>
+          </p:cNvPicPr>
+          <p:nvPr/>
+        </p:nvPicPr>
+        <p:blipFill>
+          <a:blip r:embed="rId4">
+            <a:extLst>
+              <a:ext uri="{28A0092B-C50C-407E-A947-70E740481C1C}">
+                <a14:useLocalDpi xmlns:a14="http://schemas.microsoft.com/office/drawing/2010/main" val="0"/>
+              </a:ext>
+            </a:extLst>
+          </a:blip>
+          <a:stretch>
+            <a:fillRect/>
+          </a:stretch>
+        </p:blipFill>
+        <p:spPr>
+          <a:xfrm>
+            <a:off x="4007623" y="1480817"/>
+            <a:ext cx="5082273" cy="4645151"/>
+          </a:xfrm>
+          <a:prstGeom prst="rect">
+            <a:avLst/>
+          </a:prstGeom>
+        </p:spPr>
+      </p:pic>
+      <p:sp>
+        <p:nvSpPr>
+          <p:cNvPr id="4" name="Arrow: Right 3">
+            <a:extLst>
+              <a:ext uri="{FF2B5EF4-FFF2-40B4-BE49-F238E27FC236}">
+                <a16:creationId xmlns:a16="http://schemas.microsoft.com/office/drawing/2014/main" id="{E9AA1A1D-282D-F98F-73CA-262CE21A0F9D}"/>
+              </a:ext>
+            </a:extLst>
+          </p:cNvPr>
+          <p:cNvSpPr/>
+          <p:nvPr/>
+        </p:nvSpPr>
+        <p:spPr>
+          <a:xfrm rot="9861274">
+            <a:off x="7304793" y="1609945"/>
+            <a:ext cx="1619075" cy="587230"/>
+          </a:xfrm>
+          <a:prstGeom prst="rightArrow">
+            <a:avLst/>
+          </a:prstGeom>
+        </p:spPr>
+        <p:style>
+          <a:lnRef idx="2">
+            <a:schemeClr val="accent1">
+              <a:shade val="50000"/>
+            </a:schemeClr>
+          </a:lnRef>
+          <a:fillRef idx="1">
+            <a:schemeClr val="accent1"/>
+          </a:fillRef>
+          <a:effectRef idx="0">
+            <a:schemeClr val="accent1"/>
+          </a:effectRef>
+          <a:fontRef idx="minor">
+            <a:schemeClr val="lt1"/>
+          </a:fontRef>
+        </p:style>
+        <p:txBody>
+          <a:bodyPr rtlCol="0" anchor="ctr"/>
+          <a:lstStyle/>
+          <a:p>
+            <a:pPr algn="ctr"/>
+            <a:endParaRPr lang="en-US"/>
+          </a:p>
+        </p:txBody>
+      </p:sp>
     </p:spTree>
     <p:extLst>
       <p:ext uri="{BB962C8B-B14F-4D97-AF65-F5344CB8AC3E}">
@@ -8524,7 +10108,7 @@
           <p:nvPr/>
         </p:nvPicPr>
         <p:blipFill rotWithShape="1">
-          <a:blip r:embed="rId2">
+          <a:blip r:embed="rId3">
             <a:alphaModFix amt="40000"/>
           </a:blip>
           <a:srcRect r="-1" b="15708"/>
@@ -8686,6 +10270,88 @@
           </a:fontRef>
         </p:style>
       </p:cxnSp>
+      <p:pic>
+        <p:nvPicPr>
+          <p:cNvPr id="3" name="Picture 2" descr="Diagram&#10;&#10;Description automatically generated">
+            <a:extLst>
+              <a:ext uri="{FF2B5EF4-FFF2-40B4-BE49-F238E27FC236}">
+                <a16:creationId xmlns:a16="http://schemas.microsoft.com/office/drawing/2014/main" id="{AE7ED1DD-D29F-7B83-64FF-636C342B662B}"/>
+              </a:ext>
+            </a:extLst>
+          </p:cNvPr>
+          <p:cNvPicPr>
+            <a:picLocks noChangeAspect="1"/>
+          </p:cNvPicPr>
+          <p:nvPr/>
+        </p:nvPicPr>
+        <p:blipFill>
+          <a:blip r:embed="rId4">
+            <a:extLst>
+              <a:ext uri="{28A0092B-C50C-407E-A947-70E740481C1C}">
+                <a14:useLocalDpi xmlns:a14="http://schemas.microsoft.com/office/drawing/2010/main" val="0"/>
+              </a:ext>
+            </a:extLst>
+          </a:blip>
+          <a:stretch>
+            <a:fillRect/>
+          </a:stretch>
+        </p:blipFill>
+        <p:spPr>
+          <a:xfrm>
+            <a:off x="4007623" y="1480817"/>
+            <a:ext cx="5082273" cy="4645151"/>
+          </a:xfrm>
+          <a:prstGeom prst="rect">
+            <a:avLst/>
+          </a:prstGeom>
+        </p:spPr>
+      </p:pic>
+      <p:sp>
+        <p:nvSpPr>
+          <p:cNvPr id="4" name="Arrow: Right 3">
+            <a:extLst>
+              <a:ext uri="{FF2B5EF4-FFF2-40B4-BE49-F238E27FC236}">
+                <a16:creationId xmlns:a16="http://schemas.microsoft.com/office/drawing/2014/main" id="{A78E22A7-E5DA-5D1E-4A89-9024B86B712F}"/>
+              </a:ext>
+            </a:extLst>
+          </p:cNvPr>
+          <p:cNvSpPr/>
+          <p:nvPr/>
+        </p:nvSpPr>
+        <p:spPr>
+          <a:xfrm rot="18083287">
+            <a:off x="4301531" y="3181610"/>
+            <a:ext cx="1619075" cy="587230"/>
+          </a:xfrm>
+          <a:prstGeom prst="rightArrow">
+            <a:avLst/>
+          </a:prstGeom>
+        </p:spPr>
+        <p:style>
+          <a:lnRef idx="2">
+            <a:schemeClr val="accent1">
+              <a:shade val="50000"/>
+            </a:schemeClr>
+          </a:lnRef>
+          <a:fillRef idx="1">
+            <a:schemeClr val="accent1"/>
+          </a:fillRef>
+          <a:effectRef idx="0">
+            <a:schemeClr val="accent1"/>
+          </a:effectRef>
+          <a:fontRef idx="minor">
+            <a:schemeClr val="lt1"/>
+          </a:fontRef>
+        </p:style>
+        <p:txBody>
+          <a:bodyPr rtlCol="0" anchor="ctr"/>
+          <a:lstStyle/>
+          <a:p>
+            <a:pPr algn="ctr"/>
+            <a:endParaRPr lang="en-US"/>
+          </a:p>
+        </p:txBody>
+      </p:sp>
     </p:spTree>
     <p:extLst>
       <p:ext uri="{BB962C8B-B14F-4D97-AF65-F5344CB8AC3E}">
@@ -8862,7 +10528,7 @@
           <p:nvPr/>
         </p:nvPicPr>
         <p:blipFill rotWithShape="1">
-          <a:blip r:embed="rId2">
+          <a:blip r:embed="rId3">
             <a:alphaModFix amt="40000"/>
           </a:blip>
           <a:srcRect r="-1" b="15708"/>
@@ -8870,7 +10536,7 @@
         </p:blipFill>
         <p:spPr>
           <a:xfrm>
-            <a:off x="20" y="10"/>
+            <a:off x="0" y="5871"/>
             <a:ext cx="12188932" cy="6857990"/>
           </a:xfrm>
           <a:prstGeom prst="rect">
@@ -9024,6 +10690,88 @@
           </a:fontRef>
         </p:style>
       </p:cxnSp>
+      <p:pic>
+        <p:nvPicPr>
+          <p:cNvPr id="3" name="Picture 2" descr="Diagram&#10;&#10;Description automatically generated">
+            <a:extLst>
+              <a:ext uri="{FF2B5EF4-FFF2-40B4-BE49-F238E27FC236}">
+                <a16:creationId xmlns:a16="http://schemas.microsoft.com/office/drawing/2014/main" id="{1196A33A-6733-53DD-CE48-D2D920C5BEBB}"/>
+              </a:ext>
+            </a:extLst>
+          </p:cNvPr>
+          <p:cNvPicPr>
+            <a:picLocks noChangeAspect="1"/>
+          </p:cNvPicPr>
+          <p:nvPr/>
+        </p:nvPicPr>
+        <p:blipFill>
+          <a:blip r:embed="rId4">
+            <a:extLst>
+              <a:ext uri="{28A0092B-C50C-407E-A947-70E740481C1C}">
+                <a14:useLocalDpi xmlns:a14="http://schemas.microsoft.com/office/drawing/2010/main" val="0"/>
+              </a:ext>
+            </a:extLst>
+          </a:blip>
+          <a:stretch>
+            <a:fillRect/>
+          </a:stretch>
+        </p:blipFill>
+        <p:spPr>
+          <a:xfrm>
+            <a:off x="4007623" y="1480817"/>
+            <a:ext cx="5082273" cy="4645151"/>
+          </a:xfrm>
+          <a:prstGeom prst="rect">
+            <a:avLst/>
+          </a:prstGeom>
+        </p:spPr>
+      </p:pic>
+      <p:sp>
+        <p:nvSpPr>
+          <p:cNvPr id="4" name="Arrow: Right 3">
+            <a:extLst>
+              <a:ext uri="{FF2B5EF4-FFF2-40B4-BE49-F238E27FC236}">
+                <a16:creationId xmlns:a16="http://schemas.microsoft.com/office/drawing/2014/main" id="{A2F3C461-317F-10C8-BF5A-C0DB1BE11D1C}"/>
+              </a:ext>
+            </a:extLst>
+          </p:cNvPr>
+          <p:cNvSpPr/>
+          <p:nvPr/>
+        </p:nvSpPr>
+        <p:spPr>
+          <a:xfrm rot="1373195">
+            <a:off x="4217642" y="2937185"/>
+            <a:ext cx="1619075" cy="587230"/>
+          </a:xfrm>
+          <a:prstGeom prst="rightArrow">
+            <a:avLst/>
+          </a:prstGeom>
+        </p:spPr>
+        <p:style>
+          <a:lnRef idx="2">
+            <a:schemeClr val="accent1">
+              <a:shade val="50000"/>
+            </a:schemeClr>
+          </a:lnRef>
+          <a:fillRef idx="1">
+            <a:schemeClr val="accent1"/>
+          </a:fillRef>
+          <a:effectRef idx="0">
+            <a:schemeClr val="accent1"/>
+          </a:effectRef>
+          <a:fontRef idx="minor">
+            <a:schemeClr val="lt1"/>
+          </a:fontRef>
+        </p:style>
+        <p:txBody>
+          <a:bodyPr rtlCol="0" anchor="ctr"/>
+          <a:lstStyle/>
+          <a:p>
+            <a:pPr algn="ctr"/>
+            <a:endParaRPr lang="en-US"/>
+          </a:p>
+        </p:txBody>
+      </p:sp>
     </p:spTree>
     <p:extLst>
       <p:ext uri="{BB962C8B-B14F-4D97-AF65-F5344CB8AC3E}">
@@ -9200,7 +10948,7 @@
           <p:nvPr/>
         </p:nvPicPr>
         <p:blipFill rotWithShape="1">
-          <a:blip r:embed="rId2">
+          <a:blip r:embed="rId3">
             <a:alphaModFix amt="40000"/>
           </a:blip>
           <a:srcRect r="-1" b="15708"/>
@@ -9362,6 +11110,88 @@
           </a:fontRef>
         </p:style>
       </p:cxnSp>
+      <p:pic>
+        <p:nvPicPr>
+          <p:cNvPr id="3" name="Picture 2" descr="Diagram&#10;&#10;Description automatically generated">
+            <a:extLst>
+              <a:ext uri="{FF2B5EF4-FFF2-40B4-BE49-F238E27FC236}">
+                <a16:creationId xmlns:a16="http://schemas.microsoft.com/office/drawing/2014/main" id="{4C8A3B7F-D4FA-F802-7FE5-1B1707301AA7}"/>
+              </a:ext>
+            </a:extLst>
+          </p:cNvPr>
+          <p:cNvPicPr>
+            <a:picLocks noChangeAspect="1"/>
+          </p:cNvPicPr>
+          <p:nvPr/>
+        </p:nvPicPr>
+        <p:blipFill>
+          <a:blip r:embed="rId4">
+            <a:extLst>
+              <a:ext uri="{28A0092B-C50C-407E-A947-70E740481C1C}">
+                <a14:useLocalDpi xmlns:a14="http://schemas.microsoft.com/office/drawing/2010/main" val="0"/>
+              </a:ext>
+            </a:extLst>
+          </a:blip>
+          <a:stretch>
+            <a:fillRect/>
+          </a:stretch>
+        </p:blipFill>
+        <p:spPr>
+          <a:xfrm>
+            <a:off x="4007623" y="1480817"/>
+            <a:ext cx="5082273" cy="4645151"/>
+          </a:xfrm>
+          <a:prstGeom prst="rect">
+            <a:avLst/>
+          </a:prstGeom>
+        </p:spPr>
+      </p:pic>
+      <p:sp>
+        <p:nvSpPr>
+          <p:cNvPr id="4" name="Arrow: Right 3">
+            <a:extLst>
+              <a:ext uri="{FF2B5EF4-FFF2-40B4-BE49-F238E27FC236}">
+                <a16:creationId xmlns:a16="http://schemas.microsoft.com/office/drawing/2014/main" id="{A7ECA3AE-7CAE-A622-49AB-97C551CDB2C8}"/>
+              </a:ext>
+            </a:extLst>
+          </p:cNvPr>
+          <p:cNvSpPr/>
+          <p:nvPr/>
+        </p:nvSpPr>
+        <p:spPr>
+          <a:xfrm rot="6972829">
+            <a:off x="6360229" y="3647605"/>
+            <a:ext cx="1619075" cy="587230"/>
+          </a:xfrm>
+          <a:prstGeom prst="rightArrow">
+            <a:avLst/>
+          </a:prstGeom>
+        </p:spPr>
+        <p:style>
+          <a:lnRef idx="2">
+            <a:schemeClr val="accent1">
+              <a:shade val="50000"/>
+            </a:schemeClr>
+          </a:lnRef>
+          <a:fillRef idx="1">
+            <a:schemeClr val="accent1"/>
+          </a:fillRef>
+          <a:effectRef idx="0">
+            <a:schemeClr val="accent1"/>
+          </a:effectRef>
+          <a:fontRef idx="minor">
+            <a:schemeClr val="lt1"/>
+          </a:fontRef>
+        </p:style>
+        <p:txBody>
+          <a:bodyPr rtlCol="0" anchor="ctr"/>
+          <a:lstStyle/>
+          <a:p>
+            <a:pPr algn="ctr"/>
+            <a:endParaRPr lang="en-US"/>
+          </a:p>
+        </p:txBody>
+      </p:sp>
     </p:spTree>
     <p:extLst>
       <p:ext uri="{BB962C8B-B14F-4D97-AF65-F5344CB8AC3E}">

</xml_diff>